<commit_message>
Minor revisions to the presentation
</commit_message>
<xml_diff>
--- a/Analysis/Presentation.pptx
+++ b/Analysis/Presentation.pptx
@@ -5,7 +5,7 @@
     <p:sldMasterId id="2147483795" r:id="rId1"/>
   </p:sldMasterIdLst>
   <p:notesMasterIdLst>
-    <p:notesMasterId r:id="rId13"/>
+    <p:notesMasterId r:id="rId11"/>
   </p:notesMasterIdLst>
   <p:sldIdLst>
     <p:sldId id="256" r:id="rId2"/>
@@ -16,9 +16,7 @@
     <p:sldId id="266" r:id="rId7"/>
     <p:sldId id="267" r:id="rId8"/>
     <p:sldId id="261" r:id="rId9"/>
-    <p:sldId id="262" r:id="rId10"/>
-    <p:sldId id="265" r:id="rId11"/>
-    <p:sldId id="264" r:id="rId12"/>
+    <p:sldId id="264" r:id="rId10"/>
   </p:sldIdLst>
   <p:sldSz cx="12192000" cy="6858000"/>
   <p:notesSz cx="6858000" cy="9144000"/>
@@ -117,6 +115,11 @@
       </a:defRPr>
     </a:lvl9pPr>
   </p:defaultTextStyle>
+  <p:extLst>
+    <p:ext uri="{EFAFB233-063F-42B5-8137-9DF3F51BA10A}">
+      <p15:sldGuideLst xmlns:p15="http://schemas.microsoft.com/office/powerpoint/2012/main"/>
+    </p:ext>
+  </p:extLst>
 </p:presentation>
 </file>
 
@@ -202,7 +205,7 @@
           <a:p>
             <a:fld id="{4DF9A68E-A864-4010-8D56-8009ACA0A9AE}" type="datetimeFigureOut">
               <a:rPr lang="en-US" smtClean="0"/>
-              <a:t>5/8/2021</a:t>
+              <a:t>5/9/2021</a:t>
             </a:fld>
             <a:endParaRPr lang="en-US"/>
           </a:p>
@@ -711,7 +714,7 @@
           <a:p>
             <a:fld id="{ADC6E529-259F-4322-A6DB-25F87A9CB2F3}" type="slidenum">
               <a:rPr lang="en-US" smtClean="0"/>
-              <a:t>11</a:t>
+              <a:t>9</a:t>
             </a:fld>
             <a:endParaRPr lang="en-US"/>
           </a:p>
@@ -956,7 +959,7 @@
           <a:p>
             <a:fld id="{9C1815E3-0124-4D01-B3C9-FFE642B32405}" type="datetimeFigureOut">
               <a:rPr lang="en-US" smtClean="0"/>
-              <a:t>5/8/2021</a:t>
+              <a:t>5/9/2021</a:t>
             </a:fld>
             <a:endParaRPr lang="en-US"/>
           </a:p>
@@ -1164,7 +1167,7 @@
           <a:p>
             <a:fld id="{9C1815E3-0124-4D01-B3C9-FFE642B32405}" type="datetimeFigureOut">
               <a:rPr lang="en-US" smtClean="0"/>
-              <a:t>5/8/2021</a:t>
+              <a:t>5/9/2021</a:t>
             </a:fld>
             <a:endParaRPr lang="en-US"/>
           </a:p>
@@ -1420,7 +1423,7 @@
           <a:p>
             <a:fld id="{9C1815E3-0124-4D01-B3C9-FFE642B32405}" type="datetimeFigureOut">
               <a:rPr lang="en-US" smtClean="0"/>
-              <a:t>5/8/2021</a:t>
+              <a:t>5/9/2021</a:t>
             </a:fld>
             <a:endParaRPr lang="en-US"/>
           </a:p>
@@ -1594,7 +1597,7 @@
           <a:p>
             <a:fld id="{9C1815E3-0124-4D01-B3C9-FFE642B32405}" type="datetimeFigureOut">
               <a:rPr lang="en-US" smtClean="0"/>
-              <a:t>5/8/2021</a:t>
+              <a:t>5/9/2021</a:t>
             </a:fld>
             <a:endParaRPr lang="en-US"/>
           </a:p>
@@ -1937,7 +1940,7 @@
           <a:p>
             <a:fld id="{9C1815E3-0124-4D01-B3C9-FFE642B32405}" type="datetimeFigureOut">
               <a:rPr lang="en-US" smtClean="0"/>
-              <a:t>5/8/2021</a:t>
+              <a:t>5/9/2021</a:t>
             </a:fld>
             <a:endParaRPr lang="en-US"/>
           </a:p>
@@ -2212,7 +2215,7 @@
           <a:p>
             <a:fld id="{9C1815E3-0124-4D01-B3C9-FFE642B32405}" type="datetimeFigureOut">
               <a:rPr lang="en-US" smtClean="0"/>
-              <a:t>5/8/2021</a:t>
+              <a:t>5/9/2021</a:t>
             </a:fld>
             <a:endParaRPr lang="en-US"/>
           </a:p>
@@ -2591,7 +2594,7 @@
           <a:p>
             <a:fld id="{9C1815E3-0124-4D01-B3C9-FFE642B32405}" type="datetimeFigureOut">
               <a:rPr lang="en-US" smtClean="0"/>
-              <a:t>5/8/2021</a:t>
+              <a:t>5/9/2021</a:t>
             </a:fld>
             <a:endParaRPr lang="en-US"/>
           </a:p>
@@ -2709,7 +2712,7 @@
           <a:p>
             <a:fld id="{9C1815E3-0124-4D01-B3C9-FFE642B32405}" type="datetimeFigureOut">
               <a:rPr lang="en-US" smtClean="0"/>
-              <a:t>5/8/2021</a:t>
+              <a:t>5/9/2021</a:t>
             </a:fld>
             <a:endParaRPr lang="en-US"/>
           </a:p>
@@ -2880,7 +2883,7 @@
           <a:p>
             <a:fld id="{9C1815E3-0124-4D01-B3C9-FFE642B32405}" type="datetimeFigureOut">
               <a:rPr lang="en-US" smtClean="0"/>
-              <a:t>5/8/2021</a:t>
+              <a:t>5/9/2021</a:t>
             </a:fld>
             <a:endParaRPr lang="en-US"/>
           </a:p>
@@ -3234,7 +3237,7 @@
           <a:p>
             <a:fld id="{9C1815E3-0124-4D01-B3C9-FFE642B32405}" type="datetimeFigureOut">
               <a:rPr lang="en-US" smtClean="0"/>
-              <a:t>5/8/2021</a:t>
+              <a:t>5/9/2021</a:t>
             </a:fld>
             <a:endParaRPr lang="en-US"/>
           </a:p>
@@ -3616,7 +3619,7 @@
           <a:p>
             <a:fld id="{9C1815E3-0124-4D01-B3C9-FFE642B32405}" type="datetimeFigureOut">
               <a:rPr lang="en-US" smtClean="0"/>
-              <a:t>5/8/2021</a:t>
+              <a:t>5/9/2021</a:t>
             </a:fld>
             <a:endParaRPr lang="en-US"/>
           </a:p>
@@ -3903,7 +3906,7 @@
           <a:p>
             <a:fld id="{9C1815E3-0124-4D01-B3C9-FFE642B32405}" type="datetimeFigureOut">
               <a:rPr lang="en-US" smtClean="0"/>
-              <a:t>5/8/2021</a:t>
+              <a:t>5/9/2021</a:t>
             </a:fld>
             <a:endParaRPr lang="en-US"/>
           </a:p>
@@ -4614,7 +4617,7 @@
           <a:lstStyle/>
           <a:p>
             <a:r>
-              <a:rPr lang="en-US">
+              <a:rPr lang="en-US" dirty="0">
                 <a:solidFill>
                   <a:srgbClr val="FFFFFF"/>
                 </a:solidFill>
@@ -4624,7 +4627,7 @@
           </a:p>
           <a:p>
             <a:r>
-              <a:rPr lang="en-US">
+              <a:rPr lang="en-US" dirty="0">
                 <a:solidFill>
                   <a:srgbClr val="FFFFFF"/>
                 </a:solidFill>
@@ -4693,668 +4696,6 @@
     <p:extLst>
       <p:ext uri="{BB962C8B-B14F-4D97-AF65-F5344CB8AC3E}">
         <p14:creationId xmlns:p14="http://schemas.microsoft.com/office/powerpoint/2010/main" val="3593438066"/>
-      </p:ext>
-    </p:extLst>
-  </p:cSld>
-  <p:clrMapOvr>
-    <a:masterClrMapping/>
-  </p:clrMapOvr>
-  <p:timing>
-    <p:tnLst>
-      <p:par>
-        <p:cTn id="1" dur="indefinite" restart="never" nodeType="tmRoot">
-          <p:childTnLst>
-            <p:seq concurrent="1" nextAc="seek">
-              <p:cTn id="2" dur="indefinite" nodeType="mainSeq">
-                <p:childTnLst>
-                  <p:par>
-                    <p:cTn id="3" fill="hold">
-                      <p:stCondLst>
-                        <p:cond delay="indefinite"/>
-                        <p:cond evt="onBegin" delay="0">
-                          <p:tn val="2"/>
-                        </p:cond>
-                      </p:stCondLst>
-                      <p:childTnLst>
-                        <p:par>
-                          <p:cTn id="4" fill="hold">
-                            <p:stCondLst>
-                              <p:cond delay="0"/>
-                            </p:stCondLst>
-                            <p:childTnLst>
-                              <p:par>
-                                <p:cTn id="5" presetID="10" presetClass="entr" presetSubtype="0" fill="hold" grpId="0" nodeType="withEffect">
-                                  <p:stCondLst>
-                                    <p:cond delay="2000"/>
-                                  </p:stCondLst>
-                                  <p:iterate type="lt">
-                                    <p:tmPct val="10000"/>
-                                  </p:iterate>
-                                  <p:childTnLst>
-                                    <p:set>
-                                      <p:cBhvr>
-                                        <p:cTn id="6" dur="1" fill="hold">
-                                          <p:stCondLst>
-                                            <p:cond delay="0"/>
-                                          </p:stCondLst>
-                                        </p:cTn>
-                                        <p:tgtEl>
-                                          <p:spTgt spid="3">
-                                            <p:txEl>
-                                              <p:pRg st="0" end="0"/>
-                                            </p:txEl>
-                                          </p:spTgt>
-                                        </p:tgtEl>
-                                        <p:attrNameLst>
-                                          <p:attrName>style.visibility</p:attrName>
-                                        </p:attrNameLst>
-                                      </p:cBhvr>
-                                      <p:to>
-                                        <p:strVal val="visible"/>
-                                      </p:to>
-                                    </p:set>
-                                    <p:animEffect transition="in" filter="fade">
-                                      <p:cBhvr>
-                                        <p:cTn id="7" dur="400"/>
-                                        <p:tgtEl>
-                                          <p:spTgt spid="3">
-                                            <p:txEl>
-                                              <p:pRg st="0" end="0"/>
-                                            </p:txEl>
-                                          </p:spTgt>
-                                        </p:tgtEl>
-                                      </p:cBhvr>
-                                    </p:animEffect>
-                                  </p:childTnLst>
-                                </p:cTn>
-                              </p:par>
-                              <p:par>
-                                <p:cTn id="8" presetID="10" presetClass="entr" presetSubtype="0" fill="hold" grpId="0" nodeType="withEffect">
-                                  <p:stCondLst>
-                                    <p:cond delay="500"/>
-                                  </p:stCondLst>
-                                  <p:iterate type="lt">
-                                    <p:tmPct val="10000"/>
-                                  </p:iterate>
-                                  <p:childTnLst>
-                                    <p:set>
-                                      <p:cBhvr>
-                                        <p:cTn id="9" dur="1" fill="hold">
-                                          <p:stCondLst>
-                                            <p:cond delay="0"/>
-                                          </p:stCondLst>
-                                        </p:cTn>
-                                        <p:tgtEl>
-                                          <p:spTgt spid="2"/>
-                                        </p:tgtEl>
-                                        <p:attrNameLst>
-                                          <p:attrName>style.visibility</p:attrName>
-                                        </p:attrNameLst>
-                                      </p:cBhvr>
-                                      <p:to>
-                                        <p:strVal val="visible"/>
-                                      </p:to>
-                                    </p:set>
-                                    <p:animEffect transition="in" filter="fade">
-                                      <p:cBhvr>
-                                        <p:cTn id="10" dur="400"/>
-                                        <p:tgtEl>
-                                          <p:spTgt spid="2"/>
-                                        </p:tgtEl>
-                                      </p:cBhvr>
-                                    </p:animEffect>
-                                  </p:childTnLst>
-                                </p:cTn>
-                              </p:par>
-                            </p:childTnLst>
-                          </p:cTn>
-                        </p:par>
-                      </p:childTnLst>
-                    </p:cTn>
-                  </p:par>
-                  <p:par>
-                    <p:cTn id="11" fill="hold">
-                      <p:stCondLst>
-                        <p:cond delay="indefinite"/>
-                      </p:stCondLst>
-                      <p:childTnLst>
-                        <p:par>
-                          <p:cTn id="12" fill="hold">
-                            <p:stCondLst>
-                              <p:cond delay="0"/>
-                            </p:stCondLst>
-                            <p:childTnLst>
-                              <p:par>
-                                <p:cTn id="13" presetID="10" presetClass="entr" presetSubtype="0" fill="hold" grpId="0" nodeType="clickEffect">
-                                  <p:stCondLst>
-                                    <p:cond delay="2000"/>
-                                  </p:stCondLst>
-                                  <p:iterate type="lt">
-                                    <p:tmPct val="10000"/>
-                                  </p:iterate>
-                                  <p:childTnLst>
-                                    <p:set>
-                                      <p:cBhvr>
-                                        <p:cTn id="14" dur="1" fill="hold">
-                                          <p:stCondLst>
-                                            <p:cond delay="0"/>
-                                          </p:stCondLst>
-                                        </p:cTn>
-                                        <p:tgtEl>
-                                          <p:spTgt spid="3">
-                                            <p:txEl>
-                                              <p:pRg st="1" end="1"/>
-                                            </p:txEl>
-                                          </p:spTgt>
-                                        </p:tgtEl>
-                                        <p:attrNameLst>
-                                          <p:attrName>style.visibility</p:attrName>
-                                        </p:attrNameLst>
-                                      </p:cBhvr>
-                                      <p:to>
-                                        <p:strVal val="visible"/>
-                                      </p:to>
-                                    </p:set>
-                                    <p:animEffect transition="in" filter="fade">
-                                      <p:cBhvr>
-                                        <p:cTn id="15" dur="400"/>
-                                        <p:tgtEl>
-                                          <p:spTgt spid="3">
-                                            <p:txEl>
-                                              <p:pRg st="1" end="1"/>
-                                            </p:txEl>
-                                          </p:spTgt>
-                                        </p:tgtEl>
-                                      </p:cBhvr>
-                                    </p:animEffect>
-                                  </p:childTnLst>
-                                </p:cTn>
-                              </p:par>
-                            </p:childTnLst>
-                          </p:cTn>
-                        </p:par>
-                      </p:childTnLst>
-                    </p:cTn>
-                  </p:par>
-                </p:childTnLst>
-              </p:cTn>
-              <p:prevCondLst>
-                <p:cond evt="onPrev" delay="0">
-                  <p:tgtEl>
-                    <p:sldTgt/>
-                  </p:tgtEl>
-                </p:cond>
-              </p:prevCondLst>
-              <p:nextCondLst>
-                <p:cond evt="onNext" delay="0">
-                  <p:tgtEl>
-                    <p:sldTgt/>
-                  </p:tgtEl>
-                </p:cond>
-              </p:nextCondLst>
-            </p:seq>
-          </p:childTnLst>
-        </p:cTn>
-      </p:par>
-    </p:tnLst>
-    <p:bldLst>
-      <p:bldP spid="2" grpId="0"/>
-      <p:bldP spid="3" grpId="0" build="p"/>
-    </p:bldLst>
-  </p:timing>
-</p:sld>
-</file>
-
-<file path=ppt/slides/slide10.xml><?xml version="1.0" encoding="utf-8"?>
-<p:sld xmlns:a="http://schemas.openxmlformats.org/drawingml/2006/main" xmlns:r="http://schemas.openxmlformats.org/officeDocument/2006/relationships" xmlns:p="http://schemas.openxmlformats.org/presentationml/2006/main">
-  <p:cSld>
-    <p:spTree>
-      <p:nvGrpSpPr>
-        <p:cNvPr id="1" name=""/>
-        <p:cNvGrpSpPr/>
-        <p:nvPr/>
-      </p:nvGrpSpPr>
-      <p:grpSpPr>
-        <a:xfrm>
-          <a:off x="0" y="0"/>
-          <a:ext cx="0" cy="0"/>
-          <a:chOff x="0" y="0"/>
-          <a:chExt cx="0" cy="0"/>
-        </a:xfrm>
-      </p:grpSpPr>
-      <p:pic>
-        <p:nvPicPr>
-          <p:cNvPr id="3" name="Picture 2" descr="Chart, bar chart, histogram&#10;&#10;Description automatically generated">
-            <a:extLst>
-              <a:ext uri="{FF2B5EF4-FFF2-40B4-BE49-F238E27FC236}">
-                <a16:creationId xmlns:a16="http://schemas.microsoft.com/office/drawing/2014/main" id="{C9EEEEBE-378F-4D61-9D6C-E40BB448DD0A}"/>
-              </a:ext>
-            </a:extLst>
-          </p:cNvPr>
-          <p:cNvPicPr>
-            <a:picLocks noChangeAspect="1"/>
-          </p:cNvPicPr>
-          <p:nvPr/>
-        </p:nvPicPr>
-        <p:blipFill>
-          <a:blip r:embed="rId2">
-            <a:extLst>
-              <a:ext uri="{28A0092B-C50C-407E-A947-70E740481C1C}">
-                <a14:useLocalDpi xmlns:a14="http://schemas.microsoft.com/office/drawing/2010/main" val="0"/>
-              </a:ext>
-            </a:extLst>
-          </a:blip>
-          <a:stretch>
-            <a:fillRect/>
-          </a:stretch>
-        </p:blipFill>
-        <p:spPr>
-          <a:xfrm>
-            <a:off x="1924112" y="369144"/>
-            <a:ext cx="8069427" cy="5379617"/>
-          </a:xfrm>
-          <a:prstGeom prst="rect">
-            <a:avLst/>
-          </a:prstGeom>
-        </p:spPr>
-      </p:pic>
-      <p:sp>
-        <p:nvSpPr>
-          <p:cNvPr id="4" name="Oval 3">
-            <a:extLst>
-              <a:ext uri="{FF2B5EF4-FFF2-40B4-BE49-F238E27FC236}">
-                <a16:creationId xmlns:a16="http://schemas.microsoft.com/office/drawing/2014/main" id="{C2896648-9972-4CD4-A6E8-8E3FF9B83380}"/>
-              </a:ext>
-            </a:extLst>
-          </p:cNvPr>
-          <p:cNvSpPr/>
-          <p:nvPr/>
-        </p:nvSpPr>
-        <p:spPr>
-          <a:xfrm>
-            <a:off x="5634789" y="4270159"/>
-            <a:ext cx="461211" cy="1047565"/>
-          </a:xfrm>
-          <a:prstGeom prst="ellipse">
-            <a:avLst/>
-          </a:prstGeom>
-          <a:noFill/>
-          <a:ln>
-            <a:solidFill>
-              <a:srgbClr val="FF0000"/>
-            </a:solidFill>
-          </a:ln>
-        </p:spPr>
-        <p:style>
-          <a:lnRef idx="2">
-            <a:schemeClr val="accent1">
-              <a:shade val="50000"/>
-            </a:schemeClr>
-          </a:lnRef>
-          <a:fillRef idx="1">
-            <a:schemeClr val="accent1"/>
-          </a:fillRef>
-          <a:effectRef idx="0">
-            <a:schemeClr val="accent1"/>
-          </a:effectRef>
-          <a:fontRef idx="minor">
-            <a:schemeClr val="lt1"/>
-          </a:fontRef>
-        </p:style>
-        <p:txBody>
-          <a:bodyPr rtlCol="0" anchor="ctr"/>
-          <a:lstStyle/>
-          <a:p>
-            <a:pPr algn="ctr"/>
-            <a:endParaRPr lang="en-US" dirty="0">
-              <a:solidFill>
-                <a:srgbClr val="FF0000"/>
-              </a:solidFill>
-            </a:endParaRPr>
-          </a:p>
-        </p:txBody>
-      </p:sp>
-      <p:sp>
-        <p:nvSpPr>
-          <p:cNvPr id="6" name="Oval 5">
-            <a:extLst>
-              <a:ext uri="{FF2B5EF4-FFF2-40B4-BE49-F238E27FC236}">
-                <a16:creationId xmlns:a16="http://schemas.microsoft.com/office/drawing/2014/main" id="{4B6B3E1C-402E-4AFA-A5D8-285BA1A489DF}"/>
-              </a:ext>
-            </a:extLst>
-          </p:cNvPr>
-          <p:cNvSpPr/>
-          <p:nvPr/>
-        </p:nvSpPr>
-        <p:spPr>
-          <a:xfrm>
-            <a:off x="6994552" y="4270159"/>
-            <a:ext cx="461211" cy="1047565"/>
-          </a:xfrm>
-          <a:prstGeom prst="ellipse">
-            <a:avLst/>
-          </a:prstGeom>
-          <a:noFill/>
-          <a:ln>
-            <a:solidFill>
-              <a:srgbClr val="FF0000"/>
-            </a:solidFill>
-          </a:ln>
-        </p:spPr>
-        <p:style>
-          <a:lnRef idx="2">
-            <a:schemeClr val="accent1">
-              <a:shade val="50000"/>
-            </a:schemeClr>
-          </a:lnRef>
-          <a:fillRef idx="1">
-            <a:schemeClr val="accent1"/>
-          </a:fillRef>
-          <a:effectRef idx="0">
-            <a:schemeClr val="accent1"/>
-          </a:effectRef>
-          <a:fontRef idx="minor">
-            <a:schemeClr val="lt1"/>
-          </a:fontRef>
-        </p:style>
-        <p:txBody>
-          <a:bodyPr rtlCol="0" anchor="ctr"/>
-          <a:lstStyle/>
-          <a:p>
-            <a:pPr algn="ctr"/>
-            <a:endParaRPr lang="en-US" dirty="0">
-              <a:solidFill>
-                <a:srgbClr val="FF0000"/>
-              </a:solidFill>
-            </a:endParaRPr>
-          </a:p>
-        </p:txBody>
-      </p:sp>
-      <p:cxnSp>
-        <p:nvCxnSpPr>
-          <p:cNvPr id="10" name="Straight Arrow Connector 9">
-            <a:extLst>
-              <a:ext uri="{FF2B5EF4-FFF2-40B4-BE49-F238E27FC236}">
-                <a16:creationId xmlns:a16="http://schemas.microsoft.com/office/drawing/2014/main" id="{86B1A2C1-906C-4392-80E9-B31486A6FC6E}"/>
-              </a:ext>
-            </a:extLst>
-          </p:cNvPr>
-          <p:cNvCxnSpPr/>
-          <p:nvPr/>
-        </p:nvCxnSpPr>
-        <p:spPr>
-          <a:xfrm flipH="1">
-            <a:off x="5958825" y="3364637"/>
-            <a:ext cx="370954" cy="745724"/>
-          </a:xfrm>
-          <a:prstGeom prst="straightConnector1">
-            <a:avLst/>
-          </a:prstGeom>
-          <a:ln>
-            <a:solidFill>
-              <a:srgbClr val="FF0000"/>
-            </a:solidFill>
-            <a:tailEnd type="triangle"/>
-          </a:ln>
-        </p:spPr>
-        <p:style>
-          <a:lnRef idx="1">
-            <a:schemeClr val="accent2"/>
-          </a:lnRef>
-          <a:fillRef idx="0">
-            <a:schemeClr val="accent2"/>
-          </a:fillRef>
-          <a:effectRef idx="0">
-            <a:schemeClr val="accent2"/>
-          </a:effectRef>
-          <a:fontRef idx="minor">
-            <a:schemeClr val="tx1"/>
-          </a:fontRef>
-        </p:style>
-      </p:cxnSp>
-      <p:cxnSp>
-        <p:nvCxnSpPr>
-          <p:cNvPr id="11" name="Straight Arrow Connector 10">
-            <a:extLst>
-              <a:ext uri="{FF2B5EF4-FFF2-40B4-BE49-F238E27FC236}">
-                <a16:creationId xmlns:a16="http://schemas.microsoft.com/office/drawing/2014/main" id="{A89763EB-D8CE-43D2-980C-97B807F703E6}"/>
-              </a:ext>
-            </a:extLst>
-          </p:cNvPr>
-          <p:cNvCxnSpPr>
-            <a:cxnSpLocks/>
-          </p:cNvCxnSpPr>
-          <p:nvPr/>
-        </p:nvCxnSpPr>
-        <p:spPr>
-          <a:xfrm>
-            <a:off x="6606466" y="3364637"/>
-            <a:ext cx="504548" cy="745724"/>
-          </a:xfrm>
-          <a:prstGeom prst="straightConnector1">
-            <a:avLst/>
-          </a:prstGeom>
-          <a:ln>
-            <a:solidFill>
-              <a:srgbClr val="FF0000"/>
-            </a:solidFill>
-            <a:tailEnd type="triangle"/>
-          </a:ln>
-        </p:spPr>
-        <p:style>
-          <a:lnRef idx="1">
-            <a:schemeClr val="accent2"/>
-          </a:lnRef>
-          <a:fillRef idx="0">
-            <a:schemeClr val="accent2"/>
-          </a:fillRef>
-          <a:effectRef idx="0">
-            <a:schemeClr val="accent2"/>
-          </a:effectRef>
-          <a:fontRef idx="minor">
-            <a:schemeClr val="tx1"/>
-          </a:fontRef>
-        </p:style>
-      </p:cxnSp>
-      <p:sp>
-        <p:nvSpPr>
-          <p:cNvPr id="13" name="TextBox 12">
-            <a:extLst>
-              <a:ext uri="{FF2B5EF4-FFF2-40B4-BE49-F238E27FC236}">
-                <a16:creationId xmlns:a16="http://schemas.microsoft.com/office/drawing/2014/main" id="{7A49CF82-18F2-4F22-B033-F2AC946A7C6F}"/>
-              </a:ext>
-            </a:extLst>
-          </p:cNvPr>
-          <p:cNvSpPr txBox="1"/>
-          <p:nvPr/>
-        </p:nvSpPr>
-        <p:spPr>
-          <a:xfrm>
-            <a:off x="5407455" y="2915406"/>
-            <a:ext cx="2261068" cy="369332"/>
-          </a:xfrm>
-          <a:prstGeom prst="rect">
-            <a:avLst/>
-          </a:prstGeom>
-          <a:noFill/>
-        </p:spPr>
-        <p:txBody>
-          <a:bodyPr wrap="none" rtlCol="0">
-            <a:spAutoFit/>
-          </a:bodyPr>
-          <a:lstStyle/>
-          <a:p>
-            <a:r>
-              <a:rPr lang="en-US" dirty="0">
-                <a:solidFill>
-                  <a:srgbClr val="FF0000"/>
-                </a:solidFill>
-              </a:rPr>
-              <a:t>Chicago and New York</a:t>
-            </a:r>
-          </a:p>
-        </p:txBody>
-      </p:sp>
-    </p:spTree>
-    <p:extLst>
-      <p:ext uri="{BB962C8B-B14F-4D97-AF65-F5344CB8AC3E}">
-        <p14:creationId xmlns:p14="http://schemas.microsoft.com/office/powerpoint/2010/main" val="3903528780"/>
-      </p:ext>
-    </p:extLst>
-  </p:cSld>
-  <p:clrMapOvr>
-    <a:masterClrMapping/>
-  </p:clrMapOvr>
-</p:sld>
-</file>
-
-<file path=ppt/slides/slide11.xml><?xml version="1.0" encoding="utf-8"?>
-<p:sld xmlns:a="http://schemas.openxmlformats.org/drawingml/2006/main" xmlns:r="http://schemas.openxmlformats.org/officeDocument/2006/relationships" xmlns:p="http://schemas.openxmlformats.org/presentationml/2006/main">
-  <p:cSld>
-    <p:spTree>
-      <p:nvGrpSpPr>
-        <p:cNvPr id="1" name=""/>
-        <p:cNvGrpSpPr/>
-        <p:nvPr/>
-      </p:nvGrpSpPr>
-      <p:grpSpPr>
-        <a:xfrm>
-          <a:off x="0" y="0"/>
-          <a:ext cx="0" cy="0"/>
-          <a:chOff x="0" y="0"/>
-          <a:chExt cx="0" cy="0"/>
-        </a:xfrm>
-      </p:grpSpPr>
-      <p:sp>
-        <p:nvSpPr>
-          <p:cNvPr id="2" name="Title 1">
-            <a:extLst>
-              <a:ext uri="{FF2B5EF4-FFF2-40B4-BE49-F238E27FC236}">
-                <a16:creationId xmlns:a16="http://schemas.microsoft.com/office/drawing/2014/main" id="{F51E41C4-0B3A-4A16-8FF5-93490AA28746}"/>
-              </a:ext>
-            </a:extLst>
-          </p:cNvPr>
-          <p:cNvSpPr>
-            <a:spLocks noGrp="1"/>
-          </p:cNvSpPr>
-          <p:nvPr>
-            <p:ph type="title"/>
-          </p:nvPr>
-        </p:nvSpPr>
-        <p:spPr/>
-        <p:txBody>
-          <a:bodyPr/>
-          <a:lstStyle/>
-          <a:p>
-            <a:r>
-              <a:rPr lang="en-US" dirty="0"/>
-              <a:t>Findings</a:t>
-            </a:r>
-          </a:p>
-        </p:txBody>
-      </p:sp>
-      <p:sp>
-        <p:nvSpPr>
-          <p:cNvPr id="3" name="Content Placeholder 2">
-            <a:extLst>
-              <a:ext uri="{FF2B5EF4-FFF2-40B4-BE49-F238E27FC236}">
-                <a16:creationId xmlns:a16="http://schemas.microsoft.com/office/drawing/2014/main" id="{55FFB98B-BE11-4FF0-BB5F-605B942228C8}"/>
-              </a:ext>
-            </a:extLst>
-          </p:cNvPr>
-          <p:cNvSpPr>
-            <a:spLocks noGrp="1"/>
-          </p:cNvSpPr>
-          <p:nvPr>
-            <p:ph idx="1"/>
-          </p:nvPr>
-        </p:nvSpPr>
-        <p:spPr>
-          <a:xfrm>
-            <a:off x="1097280" y="1845734"/>
-            <a:ext cx="4460141" cy="4023360"/>
-          </a:xfrm>
-        </p:spPr>
-        <p:txBody>
-          <a:bodyPr/>
-          <a:lstStyle/>
-          <a:p>
-            <a:pPr marL="0" indent="0">
-              <a:buNone/>
-            </a:pPr>
-            <a:r>
-              <a:rPr lang="en-US" dirty="0"/>
-              <a:t>   </a:t>
-            </a:r>
-          </a:p>
-          <a:p>
-            <a:pPr>
-              <a:buFont typeface="Arial" panose="020B0604020202020204" pitchFamily="34" charset="0"/>
-              <a:buChar char="•"/>
-            </a:pPr>
-            <a:r>
-              <a:rPr lang="en-US" dirty="0"/>
-              <a:t>Blacks and Asians have higher PM 2.5 exposure as they are more concentrated in big cities</a:t>
-            </a:r>
-          </a:p>
-          <a:p>
-            <a:pPr>
-              <a:buFont typeface="Arial" panose="020B0604020202020204" pitchFamily="34" charset="0"/>
-              <a:buChar char="•"/>
-            </a:pPr>
-            <a:r>
-              <a:rPr lang="en-US" dirty="0"/>
-              <a:t>Native Americans have the lowest exposure as their reservations are not close to large cities</a:t>
-            </a:r>
-          </a:p>
-          <a:p>
-            <a:pPr>
-              <a:buFont typeface="Arial" panose="020B0604020202020204" pitchFamily="34" charset="0"/>
-              <a:buChar char="•"/>
-            </a:pPr>
-            <a:endParaRPr lang="en-US" dirty="0"/>
-          </a:p>
-        </p:txBody>
-      </p:sp>
-      <p:pic>
-        <p:nvPicPr>
-          <p:cNvPr id="4" name="Content Placeholder 4" descr="Map&#10;&#10;Description automatically generated">
-            <a:extLst>
-              <a:ext uri="{FF2B5EF4-FFF2-40B4-BE49-F238E27FC236}">
-                <a16:creationId xmlns:a16="http://schemas.microsoft.com/office/drawing/2014/main" id="{78872611-867D-4AB5-AE54-E33E0EFD4CFB}"/>
-              </a:ext>
-            </a:extLst>
-          </p:cNvPr>
-          <p:cNvPicPr>
-            <a:picLocks noChangeAspect="1"/>
-          </p:cNvPicPr>
-          <p:nvPr/>
-        </p:nvPicPr>
-        <p:blipFill rotWithShape="1">
-          <a:blip r:embed="rId3">
-            <a:extLst>
-              <a:ext uri="{28A0092B-C50C-407E-A947-70E740481C1C}">
-                <a14:useLocalDpi xmlns:a14="http://schemas.microsoft.com/office/drawing/2010/main" val="0"/>
-              </a:ext>
-            </a:extLst>
-          </a:blip>
-          <a:srcRect t="1366" b="11038"/>
-          <a:stretch/>
-        </p:blipFill>
-        <p:spPr>
-          <a:xfrm>
-            <a:off x="5549530" y="2108718"/>
-            <a:ext cx="6642470" cy="3879194"/>
-          </a:xfrm>
-          <a:prstGeom prst="rect">
-            <a:avLst/>
-          </a:prstGeom>
-        </p:spPr>
-      </p:pic>
-    </p:spTree>
-    <p:extLst>
-      <p:ext uri="{BB962C8B-B14F-4D97-AF65-F5344CB8AC3E}">
-        <p14:creationId xmlns:p14="http://schemas.microsoft.com/office/powerpoint/2010/main" val="124270830"/>
       </p:ext>
     </p:extLst>
   </p:cSld>
@@ -5900,30 +5241,6 @@
                 <a:latin typeface="Calibri (Body)"/>
               </a:rPr>
               <a:t>) </a:t>
-            </a:r>
-          </a:p>
-          <a:p>
-            <a:pPr lvl="1">
-              <a:buFont typeface="Arial" panose="020B0604020202020204" pitchFamily="34" charset="0"/>
-              <a:buChar char="•"/>
-            </a:pPr>
-            <a:r>
-              <a:rPr lang="en-US" dirty="0">
-                <a:latin typeface="Calibri (Body)"/>
-              </a:rPr>
-              <a:t>BAU 2030</a:t>
-            </a:r>
-          </a:p>
-          <a:p>
-            <a:pPr>
-              <a:buFont typeface="Arial" panose="020B0604020202020204" pitchFamily="34" charset="0"/>
-              <a:buChar char="•"/>
-            </a:pPr>
-            <a:r>
-              <a:rPr lang="en-US" dirty="0">
-                <a:latin typeface="Calibri (Body)"/>
-              </a:rPr>
-              <a:t>   Census: County and state shape files</a:t>
             </a:r>
           </a:p>
         </p:txBody>
@@ -6573,12 +5890,103 @@
           <a:chExt cx="0" cy="0"/>
         </a:xfrm>
       </p:grpSpPr>
+      <p:sp>
+        <p:nvSpPr>
+          <p:cNvPr id="2" name="Title 1">
+            <a:extLst>
+              <a:ext uri="{FF2B5EF4-FFF2-40B4-BE49-F238E27FC236}">
+                <a16:creationId xmlns:a16="http://schemas.microsoft.com/office/drawing/2014/main" id="{F51E41C4-0B3A-4A16-8FF5-93490AA28746}"/>
+              </a:ext>
+            </a:extLst>
+          </p:cNvPr>
+          <p:cNvSpPr>
+            <a:spLocks noGrp="1"/>
+          </p:cNvSpPr>
+          <p:nvPr>
+            <p:ph type="title"/>
+          </p:nvPr>
+        </p:nvSpPr>
+        <p:spPr/>
+        <p:txBody>
+          <a:bodyPr/>
+          <a:lstStyle/>
+          <a:p>
+            <a:r>
+              <a:rPr lang="en-US" dirty="0"/>
+              <a:t>Findings</a:t>
+            </a:r>
+          </a:p>
+        </p:txBody>
+      </p:sp>
+      <p:sp>
+        <p:nvSpPr>
+          <p:cNvPr id="3" name="Content Placeholder 2">
+            <a:extLst>
+              <a:ext uri="{FF2B5EF4-FFF2-40B4-BE49-F238E27FC236}">
+                <a16:creationId xmlns:a16="http://schemas.microsoft.com/office/drawing/2014/main" id="{55FFB98B-BE11-4FF0-BB5F-605B942228C8}"/>
+              </a:ext>
+            </a:extLst>
+          </p:cNvPr>
+          <p:cNvSpPr>
+            <a:spLocks noGrp="1"/>
+          </p:cNvSpPr>
+          <p:nvPr>
+            <p:ph idx="1"/>
+          </p:nvPr>
+        </p:nvSpPr>
+        <p:spPr>
+          <a:xfrm>
+            <a:off x="1097280" y="1845734"/>
+            <a:ext cx="4460141" cy="4023360"/>
+          </a:xfrm>
+        </p:spPr>
+        <p:txBody>
+          <a:bodyPr/>
+          <a:lstStyle/>
+          <a:p>
+            <a:pPr marL="0" indent="0">
+              <a:buNone/>
+            </a:pPr>
+            <a:r>
+              <a:rPr lang="en-US" dirty="0"/>
+              <a:t>   </a:t>
+            </a:r>
+          </a:p>
+          <a:p>
+            <a:pPr>
+              <a:buFont typeface="Arial" panose="020B0604020202020204" pitchFamily="34" charset="0"/>
+              <a:buChar char="•"/>
+            </a:pPr>
+            <a:r>
+              <a:rPr lang="en-US" dirty="0"/>
+              <a:t>Blacks and Asians have higher PM 2.5 exposure as they are more concentrated in big cities</a:t>
+            </a:r>
+          </a:p>
+          <a:p>
+            <a:pPr>
+              <a:buFont typeface="Arial" panose="020B0604020202020204" pitchFamily="34" charset="0"/>
+              <a:buChar char="•"/>
+            </a:pPr>
+            <a:r>
+              <a:rPr lang="en-US" dirty="0"/>
+              <a:t>Native Americans have the lowest exposure as their reservations are not close to large cities</a:t>
+            </a:r>
+          </a:p>
+          <a:p>
+            <a:pPr>
+              <a:buFont typeface="Arial" panose="020B0604020202020204" pitchFamily="34" charset="0"/>
+              <a:buChar char="•"/>
+            </a:pPr>
+            <a:endParaRPr lang="en-US" dirty="0"/>
+          </a:p>
+        </p:txBody>
+      </p:sp>
       <p:pic>
         <p:nvPicPr>
-          <p:cNvPr id="3" name="Picture 2" descr="Chart, bar chart, histogram&#10;&#10;Description automatically generated">
+          <p:cNvPr id="4" name="Content Placeholder 4" descr="Map&#10;&#10;Description automatically generated">
             <a:extLst>
               <a:ext uri="{FF2B5EF4-FFF2-40B4-BE49-F238E27FC236}">
-                <a16:creationId xmlns:a16="http://schemas.microsoft.com/office/drawing/2014/main" id="{C9EEEEBE-378F-4D61-9D6C-E40BB448DD0A}"/>
+                <a16:creationId xmlns:a16="http://schemas.microsoft.com/office/drawing/2014/main" id="{78872611-867D-4AB5-AE54-E33E0EFD4CFB}"/>
               </a:ext>
             </a:extLst>
           </p:cNvPr>
@@ -6587,22 +5995,21 @@
           </p:cNvPicPr>
           <p:nvPr/>
         </p:nvPicPr>
-        <p:blipFill>
-          <a:blip r:embed="rId2">
+        <p:blipFill rotWithShape="1">
+          <a:blip r:embed="rId3">
             <a:extLst>
               <a:ext uri="{28A0092B-C50C-407E-A947-70E740481C1C}">
                 <a14:useLocalDpi xmlns:a14="http://schemas.microsoft.com/office/drawing/2010/main" val="0"/>
               </a:ext>
             </a:extLst>
           </a:blip>
-          <a:stretch>
-            <a:fillRect/>
-          </a:stretch>
+          <a:srcRect t="1366" b="11038"/>
+          <a:stretch/>
         </p:blipFill>
         <p:spPr>
           <a:xfrm>
-            <a:off x="1932989" y="360268"/>
-            <a:ext cx="8069427" cy="5379617"/>
+            <a:off x="5549530" y="2108718"/>
+            <a:ext cx="6642470" cy="3879194"/>
           </a:xfrm>
           <a:prstGeom prst="rect">
             <a:avLst/>
@@ -6612,7 +6019,7 @@
     </p:spTree>
     <p:extLst>
       <p:ext uri="{BB962C8B-B14F-4D97-AF65-F5344CB8AC3E}">
-        <p14:creationId xmlns:p14="http://schemas.microsoft.com/office/powerpoint/2010/main" val="3424481717"/>
+        <p14:creationId xmlns:p14="http://schemas.microsoft.com/office/powerpoint/2010/main" val="124270830"/>
       </p:ext>
     </p:extLst>
   </p:cSld>

</xml_diff>